<commit_message>
Atualização no ppt e algumas documentações
</commit_message>
<xml_diff>
--- a/_Projeto-Estagio_/Projeto/documentacao/Documentos/Projeto.pptx
+++ b/_Projeto-Estagio_/Projeto/documentacao/Documentos/Projeto.pptx
@@ -11,12 +11,15 @@
     <p:sldId id="259" r:id="rId5"/>
     <p:sldId id="265" r:id="rId6"/>
     <p:sldId id="266" r:id="rId7"/>
-    <p:sldId id="260" r:id="rId8"/>
-    <p:sldId id="262" r:id="rId9"/>
-    <p:sldId id="263" r:id="rId10"/>
-    <p:sldId id="264" r:id="rId11"/>
-    <p:sldId id="261" r:id="rId12"/>
-    <p:sldId id="267" r:id="rId13"/>
+    <p:sldId id="268" r:id="rId8"/>
+    <p:sldId id="269" r:id="rId9"/>
+    <p:sldId id="270" r:id="rId10"/>
+    <p:sldId id="260" r:id="rId11"/>
+    <p:sldId id="262" r:id="rId12"/>
+    <p:sldId id="263" r:id="rId13"/>
+    <p:sldId id="264" r:id="rId14"/>
+    <p:sldId id="261" r:id="rId15"/>
+    <p:sldId id="267" r:id="rId16"/>
   </p:sldIdLst>
   <p:sldSz cx="12192000" cy="6858000"/>
   <p:notesSz cx="6858000" cy="9144000"/>
@@ -309,7 +312,7 @@
           <a:p>
             <a:fld id="{783FC08E-0FB3-4AA1-83A0-094D726300BE}" type="datetimeFigureOut">
               <a:rPr lang="pt-BR" smtClean="0"/>
-              <a:t>01/12/2020</a:t>
+              <a:t>03/12/2020</a:t>
             </a:fld>
             <a:endParaRPr lang="pt-BR"/>
           </a:p>
@@ -584,7 +587,7 @@
           <a:p>
             <a:fld id="{783FC08E-0FB3-4AA1-83A0-094D726300BE}" type="datetimeFigureOut">
               <a:rPr lang="pt-BR" smtClean="0"/>
-              <a:t>01/12/2020</a:t>
+              <a:t>03/12/2020</a:t>
             </a:fld>
             <a:endParaRPr lang="pt-BR"/>
           </a:p>
@@ -778,7 +781,7 @@
           <a:p>
             <a:fld id="{783FC08E-0FB3-4AA1-83A0-094D726300BE}" type="datetimeFigureOut">
               <a:rPr lang="pt-BR" smtClean="0"/>
-              <a:t>01/12/2020</a:t>
+              <a:t>03/12/2020</a:t>
             </a:fld>
             <a:endParaRPr lang="pt-BR"/>
           </a:p>
@@ -1051,7 +1054,7 @@
           <a:p>
             <a:fld id="{783FC08E-0FB3-4AA1-83A0-094D726300BE}" type="datetimeFigureOut">
               <a:rPr lang="pt-BR" smtClean="0"/>
-              <a:t>01/12/2020</a:t>
+              <a:t>03/12/2020</a:t>
             </a:fld>
             <a:endParaRPr lang="pt-BR"/>
           </a:p>
@@ -1392,7 +1395,7 @@
           <a:p>
             <a:fld id="{783FC08E-0FB3-4AA1-83A0-094D726300BE}" type="datetimeFigureOut">
               <a:rPr lang="pt-BR" smtClean="0"/>
-              <a:t>01/12/2020</a:t>
+              <a:t>03/12/2020</a:t>
             </a:fld>
             <a:endParaRPr lang="pt-BR"/>
           </a:p>
@@ -2015,7 +2018,7 @@
           <a:p>
             <a:fld id="{783FC08E-0FB3-4AA1-83A0-094D726300BE}" type="datetimeFigureOut">
               <a:rPr lang="pt-BR" smtClean="0"/>
-              <a:t>01/12/2020</a:t>
+              <a:t>03/12/2020</a:t>
             </a:fld>
             <a:endParaRPr lang="pt-BR"/>
           </a:p>
@@ -2875,7 +2878,7 @@
           <a:p>
             <a:fld id="{783FC08E-0FB3-4AA1-83A0-094D726300BE}" type="datetimeFigureOut">
               <a:rPr lang="pt-BR" smtClean="0"/>
-              <a:t>01/12/2020</a:t>
+              <a:t>03/12/2020</a:t>
             </a:fld>
             <a:endParaRPr lang="pt-BR"/>
           </a:p>
@@ -3045,7 +3048,7 @@
           <a:p>
             <a:fld id="{783FC08E-0FB3-4AA1-83A0-094D726300BE}" type="datetimeFigureOut">
               <a:rPr lang="pt-BR" smtClean="0"/>
-              <a:t>01/12/2020</a:t>
+              <a:t>03/12/2020</a:t>
             </a:fld>
             <a:endParaRPr lang="pt-BR"/>
           </a:p>
@@ -3225,7 +3228,7 @@
           <a:p>
             <a:fld id="{783FC08E-0FB3-4AA1-83A0-094D726300BE}" type="datetimeFigureOut">
               <a:rPr lang="pt-BR" smtClean="0"/>
-              <a:t>01/12/2020</a:t>
+              <a:t>03/12/2020</a:t>
             </a:fld>
             <a:endParaRPr lang="pt-BR"/>
           </a:p>
@@ -3395,7 +3398,7 @@
           <a:p>
             <a:fld id="{783FC08E-0FB3-4AA1-83A0-094D726300BE}" type="datetimeFigureOut">
               <a:rPr lang="pt-BR" smtClean="0"/>
-              <a:t>01/12/2020</a:t>
+              <a:t>03/12/2020</a:t>
             </a:fld>
             <a:endParaRPr lang="pt-BR"/>
           </a:p>
@@ -3642,7 +3645,7 @@
           <a:p>
             <a:fld id="{783FC08E-0FB3-4AA1-83A0-094D726300BE}" type="datetimeFigureOut">
               <a:rPr lang="pt-BR" smtClean="0"/>
-              <a:t>01/12/2020</a:t>
+              <a:t>03/12/2020</a:t>
             </a:fld>
             <a:endParaRPr lang="pt-BR"/>
           </a:p>
@@ -3934,7 +3937,7 @@
           <a:p>
             <a:fld id="{783FC08E-0FB3-4AA1-83A0-094D726300BE}" type="datetimeFigureOut">
               <a:rPr lang="pt-BR" smtClean="0"/>
-              <a:t>01/12/2020</a:t>
+              <a:t>03/12/2020</a:t>
             </a:fld>
             <a:endParaRPr lang="pt-BR"/>
           </a:p>
@@ -4378,7 +4381,7 @@
           <a:p>
             <a:fld id="{783FC08E-0FB3-4AA1-83A0-094D726300BE}" type="datetimeFigureOut">
               <a:rPr lang="pt-BR" smtClean="0"/>
-              <a:t>01/12/2020</a:t>
+              <a:t>03/12/2020</a:t>
             </a:fld>
             <a:endParaRPr lang="pt-BR"/>
           </a:p>
@@ -4496,7 +4499,7 @@
           <a:p>
             <a:fld id="{783FC08E-0FB3-4AA1-83A0-094D726300BE}" type="datetimeFigureOut">
               <a:rPr lang="pt-BR" smtClean="0"/>
-              <a:t>01/12/2020</a:t>
+              <a:t>03/12/2020</a:t>
             </a:fld>
             <a:endParaRPr lang="pt-BR"/>
           </a:p>
@@ -4591,7 +4594,7 @@
           <a:p>
             <a:fld id="{783FC08E-0FB3-4AA1-83A0-094D726300BE}" type="datetimeFigureOut">
               <a:rPr lang="pt-BR" smtClean="0"/>
-              <a:t>01/12/2020</a:t>
+              <a:t>03/12/2020</a:t>
             </a:fld>
             <a:endParaRPr lang="pt-BR"/>
           </a:p>
@@ -4870,7 +4873,7 @@
           <a:p>
             <a:fld id="{783FC08E-0FB3-4AA1-83A0-094D726300BE}" type="datetimeFigureOut">
               <a:rPr lang="pt-BR" smtClean="0"/>
-              <a:t>01/12/2020</a:t>
+              <a:t>03/12/2020</a:t>
             </a:fld>
             <a:endParaRPr lang="pt-BR"/>
           </a:p>
@@ -5145,7 +5148,7 @@
           <a:p>
             <a:fld id="{783FC08E-0FB3-4AA1-83A0-094D726300BE}" type="datetimeFigureOut">
               <a:rPr lang="pt-BR" smtClean="0"/>
-              <a:t>01/12/2020</a:t>
+              <a:t>03/12/2020</a:t>
             </a:fld>
             <a:endParaRPr lang="pt-BR"/>
           </a:p>
@@ -5574,7 +5577,7 @@
           <a:p>
             <a:fld id="{783FC08E-0FB3-4AA1-83A0-094D726300BE}" type="datetimeFigureOut">
               <a:rPr lang="pt-BR" smtClean="0"/>
-              <a:t>01/12/2020</a:t>
+              <a:t>03/12/2020</a:t>
             </a:fld>
             <a:endParaRPr lang="pt-BR"/>
           </a:p>
@@ -6209,6 +6212,42 @@
           <a:chExt cx="0" cy="0"/>
         </a:xfrm>
       </p:grpSpPr>
+      <p:sp>
+        <p:nvSpPr>
+          <p:cNvPr id="6" name="CaixaDeTexto 5"/>
+          <p:cNvSpPr txBox="1"/>
+          <p:nvPr/>
+        </p:nvSpPr>
+        <p:spPr>
+          <a:xfrm>
+            <a:off x="4591858" y="640558"/>
+            <a:ext cx="2632212" cy="830997"/>
+          </a:xfrm>
+          <a:prstGeom prst="rect">
+            <a:avLst/>
+          </a:prstGeom>
+          <a:noFill/>
+        </p:spPr>
+        <p:txBody>
+          <a:bodyPr wrap="square" rtlCol="0">
+            <a:spAutoFit/>
+          </a:bodyPr>
+          <a:lstStyle/>
+          <a:p>
+            <a:r>
+              <a:rPr lang="pt-BR" sz="4800" dirty="0" err="1" smtClean="0">
+                <a:latin typeface="Arial" panose="020B0604020202020204" pitchFamily="34" charset="0"/>
+                <a:cs typeface="Arial" panose="020B0604020202020204" pitchFamily="34" charset="0"/>
+              </a:rPr>
+              <a:t>Backlog</a:t>
+            </a:r>
+            <a:endParaRPr lang="pt-BR" sz="5400" dirty="0">
+              <a:latin typeface="Arial" panose="020B0604020202020204" pitchFamily="34" charset="0"/>
+              <a:cs typeface="Arial" panose="020B0604020202020204" pitchFamily="34" charset="0"/>
+            </a:endParaRPr>
+          </a:p>
+        </p:txBody>
+      </p:sp>
       <p:pic>
         <p:nvPicPr>
           <p:cNvPr id="2" name="Imagem 1"/>
@@ -6218,15 +6257,21 @@
           <p:nvPr/>
         </p:nvPicPr>
         <p:blipFill>
-          <a:blip r:embed="rId2"/>
+          <a:blip r:embed="rId2">
+            <a:extLst>
+              <a:ext uri="{28A0092B-C50C-407E-A947-70E740481C1C}">
+                <a14:useLocalDpi xmlns:a14="http://schemas.microsoft.com/office/drawing/2010/main" val="0"/>
+              </a:ext>
+            </a:extLst>
+          </a:blip>
           <a:stretch>
             <a:fillRect/>
           </a:stretch>
         </p:blipFill>
         <p:spPr>
           <a:xfrm>
-            <a:off x="0" y="-50464"/>
-            <a:ext cx="12192000" cy="6908464"/>
+            <a:off x="856216" y="1921996"/>
+            <a:ext cx="10103496" cy="3433775"/>
           </a:xfrm>
           <a:prstGeom prst="rect">
             <a:avLst/>
@@ -6236,7 +6281,7 @@
     </p:spTree>
     <p:extLst>
       <p:ext uri="{BB962C8B-B14F-4D97-AF65-F5344CB8AC3E}">
-        <p14:creationId xmlns:p14="http://schemas.microsoft.com/office/powerpoint/2010/main" val="658098768"/>
+        <p14:creationId xmlns:p14="http://schemas.microsoft.com/office/powerpoint/2010/main" val="1410908608"/>
       </p:ext>
     </p:extLst>
   </p:cSld>
@@ -6270,40 +6315,16 @@
           <a:chExt cx="0" cy="0"/>
         </a:xfrm>
       </p:grpSpPr>
-      <p:pic>
-        <p:nvPicPr>
-          <p:cNvPr id="4" name="Imagem 3"/>
-          <p:cNvPicPr>
-            <a:picLocks noChangeAspect="1"/>
-          </p:cNvPicPr>
-          <p:nvPr/>
-        </p:nvPicPr>
-        <p:blipFill>
-          <a:blip r:embed="rId2"/>
-          <a:stretch>
-            <a:fillRect/>
-          </a:stretch>
-        </p:blipFill>
-        <p:spPr>
-          <a:xfrm>
-            <a:off x="3457591" y="367535"/>
-            <a:ext cx="7882569" cy="6217138"/>
-          </a:xfrm>
-          <a:prstGeom prst="rect">
-            <a:avLst/>
-          </a:prstGeom>
-        </p:spPr>
-      </p:pic>
-      <p:sp>
-        <p:nvSpPr>
-          <p:cNvPr id="5" name="CaixaDeTexto 4"/>
+      <p:sp>
+        <p:nvSpPr>
+          <p:cNvPr id="4" name="CaixaDeTexto 3"/>
           <p:cNvSpPr txBox="1"/>
           <p:nvPr/>
         </p:nvSpPr>
         <p:spPr>
           <a:xfrm>
-            <a:off x="328616" y="367535"/>
-            <a:ext cx="2842095" cy="584775"/>
+            <a:off x="1948068" y="2590886"/>
+            <a:ext cx="8537843" cy="1107996"/>
           </a:xfrm>
           <a:prstGeom prst="rect">
             <a:avLst/>
@@ -6317,30 +6338,17 @@
           <a:lstStyle/>
           <a:p>
             <a:r>
-              <a:rPr lang="pt-BR" sz="2800" b="1" dirty="0" smtClean="0">
-                <a:latin typeface="Arial" panose="020B0604020202020204" pitchFamily="34" charset="0"/>
-                <a:cs typeface="Arial" panose="020B0604020202020204" pitchFamily="34" charset="0"/>
-              </a:rPr>
-              <a:t>Modelo</a:t>
-            </a:r>
-            <a:r>
-              <a:rPr lang="pt-BR" sz="3200" b="1" dirty="0" smtClean="0">
-                <a:latin typeface="Arial" panose="020B0604020202020204" pitchFamily="34" charset="0"/>
-                <a:cs typeface="Arial" panose="020B0604020202020204" pitchFamily="34" charset="0"/>
-              </a:rPr>
-              <a:t> lógico</a:t>
-            </a:r>
-            <a:endParaRPr lang="pt-BR" sz="3200" b="1" dirty="0">
-              <a:latin typeface="Arial" panose="020B0604020202020204" pitchFamily="34" charset="0"/>
-              <a:cs typeface="Arial" panose="020B0604020202020204" pitchFamily="34" charset="0"/>
-            </a:endParaRPr>
+              <a:rPr lang="pt-BR" sz="6600" b="1" dirty="0" smtClean="0"/>
+              <a:t>Solução de negócio</a:t>
+            </a:r>
+            <a:endParaRPr lang="pt-BR" sz="6600" b="1" dirty="0"/>
           </a:p>
         </p:txBody>
       </p:sp>
     </p:spTree>
     <p:extLst>
       <p:ext uri="{BB962C8B-B14F-4D97-AF65-F5344CB8AC3E}">
-        <p14:creationId xmlns:p14="http://schemas.microsoft.com/office/powerpoint/2010/main" val="4193894347"/>
+        <p14:creationId xmlns:p14="http://schemas.microsoft.com/office/powerpoint/2010/main" val="2633481473"/>
       </p:ext>
     </p:extLst>
   </p:cSld>
@@ -6374,16 +6382,138 @@
           <a:chExt cx="0" cy="0"/>
         </a:xfrm>
       </p:grpSpPr>
-      <p:sp>
-        <p:nvSpPr>
-          <p:cNvPr id="4" name="CaixaDeTexto 3"/>
+      <p:pic>
+        <p:nvPicPr>
+          <p:cNvPr id="4" name="Imagem 3"/>
+          <p:cNvPicPr>
+            <a:picLocks noChangeAspect="1"/>
+          </p:cNvPicPr>
+          <p:nvPr/>
+        </p:nvPicPr>
+        <p:blipFill>
+          <a:blip r:embed="rId2"/>
+          <a:stretch>
+            <a:fillRect/>
+          </a:stretch>
+        </p:blipFill>
+        <p:spPr>
+          <a:xfrm>
+            <a:off x="0" y="0"/>
+            <a:ext cx="12191999" cy="6858981"/>
+          </a:xfrm>
+          <a:prstGeom prst="rect">
+            <a:avLst/>
+          </a:prstGeom>
+        </p:spPr>
+      </p:pic>
+    </p:spTree>
+    <p:extLst>
+      <p:ext uri="{BB962C8B-B14F-4D97-AF65-F5344CB8AC3E}">
+        <p14:creationId xmlns:p14="http://schemas.microsoft.com/office/powerpoint/2010/main" val="3254657391"/>
+      </p:ext>
+    </p:extLst>
+  </p:cSld>
+  <p:clrMapOvr>
+    <a:masterClrMapping/>
+  </p:clrMapOvr>
+  <p:timing>
+    <p:tnLst>
+      <p:par>
+        <p:cTn id="1" dur="indefinite" restart="never" nodeType="tmRoot"/>
+      </p:par>
+    </p:tnLst>
+  </p:timing>
+</p:sld>
+</file>
+
+<file path=ppt/slides/slide13.xml><?xml version="1.0" encoding="utf-8"?>
+<p:sld xmlns:a="http://schemas.openxmlformats.org/drawingml/2006/main" xmlns:r="http://schemas.openxmlformats.org/officeDocument/2006/relationships" xmlns:p="http://schemas.openxmlformats.org/presentationml/2006/main">
+  <p:cSld>
+    <p:spTree>
+      <p:nvGrpSpPr>
+        <p:cNvPr id="1" name=""/>
+        <p:cNvGrpSpPr/>
+        <p:nvPr/>
+      </p:nvGrpSpPr>
+      <p:grpSpPr>
+        <a:xfrm>
+          <a:off x="0" y="0"/>
+          <a:ext cx="0" cy="0"/>
+          <a:chOff x="0" y="0"/>
+          <a:chExt cx="0" cy="0"/>
+        </a:xfrm>
+      </p:grpSpPr>
+      <p:pic>
+        <p:nvPicPr>
+          <p:cNvPr id="2" name="Imagem 1"/>
+          <p:cNvPicPr>
+            <a:picLocks noChangeAspect="1"/>
+          </p:cNvPicPr>
+          <p:nvPr/>
+        </p:nvPicPr>
+        <p:blipFill>
+          <a:blip r:embed="rId2"/>
+          <a:stretch>
+            <a:fillRect/>
+          </a:stretch>
+        </p:blipFill>
+        <p:spPr>
+          <a:xfrm>
+            <a:off x="0" y="-50464"/>
+            <a:ext cx="12192000" cy="6908464"/>
+          </a:xfrm>
+          <a:prstGeom prst="rect">
+            <a:avLst/>
+          </a:prstGeom>
+        </p:spPr>
+      </p:pic>
+    </p:spTree>
+    <p:extLst>
+      <p:ext uri="{BB962C8B-B14F-4D97-AF65-F5344CB8AC3E}">
+        <p14:creationId xmlns:p14="http://schemas.microsoft.com/office/powerpoint/2010/main" val="658098768"/>
+      </p:ext>
+    </p:extLst>
+  </p:cSld>
+  <p:clrMapOvr>
+    <a:masterClrMapping/>
+  </p:clrMapOvr>
+  <p:timing>
+    <p:tnLst>
+      <p:par>
+        <p:cTn id="1" dur="indefinite" restart="never" nodeType="tmRoot"/>
+      </p:par>
+    </p:tnLst>
+  </p:timing>
+</p:sld>
+</file>
+
+<file path=ppt/slides/slide14.xml><?xml version="1.0" encoding="utf-8"?>
+<p:sld xmlns:a="http://schemas.openxmlformats.org/drawingml/2006/main" xmlns:r="http://schemas.openxmlformats.org/officeDocument/2006/relationships" xmlns:p="http://schemas.openxmlformats.org/presentationml/2006/main">
+  <p:cSld>
+    <p:spTree>
+      <p:nvGrpSpPr>
+        <p:cNvPr id="1" name=""/>
+        <p:cNvGrpSpPr/>
+        <p:nvPr/>
+      </p:nvGrpSpPr>
+      <p:grpSpPr>
+        <a:xfrm>
+          <a:off x="0" y="0"/>
+          <a:ext cx="0" cy="0"/>
+          <a:chOff x="0" y="0"/>
+          <a:chExt cx="0" cy="0"/>
+        </a:xfrm>
+      </p:grpSpPr>
+      <p:sp>
+        <p:nvSpPr>
+          <p:cNvPr id="5" name="CaixaDeTexto 4"/>
           <p:cNvSpPr txBox="1"/>
           <p:nvPr/>
         </p:nvSpPr>
         <p:spPr>
           <a:xfrm>
-            <a:off x="3466183" y="641268"/>
-            <a:ext cx="4902074" cy="830997"/>
+            <a:off x="328616" y="367535"/>
+            <a:ext cx="2842095" cy="584775"/>
           </a:xfrm>
           <a:prstGeom prst="rect">
             <a:avLst/>
@@ -6396,10 +6526,120 @@
           </a:bodyPr>
           <a:lstStyle/>
           <a:p>
+            <a:r>
+              <a:rPr lang="pt-BR" sz="2800" b="1" dirty="0" smtClean="0">
+                <a:latin typeface="Arial" panose="020B0604020202020204" pitchFamily="34" charset="0"/>
+                <a:cs typeface="Arial" panose="020B0604020202020204" pitchFamily="34" charset="0"/>
+              </a:rPr>
+              <a:t>Modelo</a:t>
+            </a:r>
+            <a:r>
+              <a:rPr lang="pt-BR" sz="3200" b="1" dirty="0" smtClean="0">
+                <a:latin typeface="Arial" panose="020B0604020202020204" pitchFamily="34" charset="0"/>
+                <a:cs typeface="Arial" panose="020B0604020202020204" pitchFamily="34" charset="0"/>
+              </a:rPr>
+              <a:t> lógico</a:t>
+            </a:r>
+            <a:endParaRPr lang="pt-BR" sz="3200" b="1" dirty="0">
+              <a:latin typeface="Arial" panose="020B0604020202020204" pitchFamily="34" charset="0"/>
+              <a:cs typeface="Arial" panose="020B0604020202020204" pitchFamily="34" charset="0"/>
+            </a:endParaRPr>
+          </a:p>
+        </p:txBody>
+      </p:sp>
+      <p:pic>
+        <p:nvPicPr>
+          <p:cNvPr id="2" name="Imagem 1"/>
+          <p:cNvPicPr>
+            <a:picLocks noChangeAspect="1"/>
+          </p:cNvPicPr>
+          <p:nvPr/>
+        </p:nvPicPr>
+        <p:blipFill>
+          <a:blip r:embed="rId2">
+            <a:extLst>
+              <a:ext uri="{28A0092B-C50C-407E-A947-70E740481C1C}">
+                <a14:useLocalDpi xmlns:a14="http://schemas.microsoft.com/office/drawing/2010/main" val="0"/>
+              </a:ext>
+            </a:extLst>
+          </a:blip>
+          <a:stretch>
+            <a:fillRect/>
+          </a:stretch>
+        </p:blipFill>
+        <p:spPr>
+          <a:xfrm>
+            <a:off x="3624262" y="33337"/>
+            <a:ext cx="4943475" cy="6791325"/>
+          </a:xfrm>
+          <a:prstGeom prst="rect">
+            <a:avLst/>
+          </a:prstGeom>
+        </p:spPr>
+      </p:pic>
+    </p:spTree>
+    <p:extLst>
+      <p:ext uri="{BB962C8B-B14F-4D97-AF65-F5344CB8AC3E}">
+        <p14:creationId xmlns:p14="http://schemas.microsoft.com/office/powerpoint/2010/main" val="4193894347"/>
+      </p:ext>
+    </p:extLst>
+  </p:cSld>
+  <p:clrMapOvr>
+    <a:masterClrMapping/>
+  </p:clrMapOvr>
+  <p:timing>
+    <p:tnLst>
+      <p:par>
+        <p:cTn id="1" dur="indefinite" restart="never" nodeType="tmRoot"/>
+      </p:par>
+    </p:tnLst>
+  </p:timing>
+</p:sld>
+</file>
+
+<file path=ppt/slides/slide15.xml><?xml version="1.0" encoding="utf-8"?>
+<p:sld xmlns:a="http://schemas.openxmlformats.org/drawingml/2006/main" xmlns:r="http://schemas.openxmlformats.org/officeDocument/2006/relationships" xmlns:p="http://schemas.openxmlformats.org/presentationml/2006/main">
+  <p:cSld>
+    <p:spTree>
+      <p:nvGrpSpPr>
+        <p:cNvPr id="1" name=""/>
+        <p:cNvGrpSpPr/>
+        <p:nvPr/>
+      </p:nvGrpSpPr>
+      <p:grpSpPr>
+        <a:xfrm>
+          <a:off x="0" y="0"/>
+          <a:ext cx="0" cy="0"/>
+          <a:chOff x="0" y="0"/>
+          <a:chExt cx="0" cy="0"/>
+        </a:xfrm>
+      </p:grpSpPr>
+      <p:sp>
+        <p:nvSpPr>
+          <p:cNvPr id="4" name="CaixaDeTexto 3"/>
+          <p:cNvSpPr txBox="1"/>
+          <p:nvPr/>
+        </p:nvSpPr>
+        <p:spPr>
+          <a:xfrm>
+            <a:off x="3466183" y="641268"/>
+            <a:ext cx="4902074" cy="830997"/>
+          </a:xfrm>
+          <a:prstGeom prst="rect">
+            <a:avLst/>
+          </a:prstGeom>
+          <a:noFill/>
+        </p:spPr>
+        <p:txBody>
+          <a:bodyPr wrap="square" rtlCol="0">
+            <a:spAutoFit/>
+          </a:bodyPr>
+          <a:lstStyle/>
+          <a:p>
             <a:pPr algn="ctr"/>
             <a:r>
-              <a:rPr lang="pt-BR" sz="4800" b="1" dirty="0" err="1" smtClean="0"/>
-              <a:t>Agredecimento</a:t>
+              <a:rPr lang="pt-BR" sz="4800" b="1" dirty="0" smtClean="0"/>
+              <a:t>Agradecimento</a:t>
             </a:r>
             <a:endParaRPr lang="pt-BR" sz="4800" b="1" dirty="0"/>
           </a:p>
@@ -6542,34 +6782,20 @@
                 <a:latin typeface="Arial" panose="020B0604020202020204" pitchFamily="34" charset="0"/>
                 <a:cs typeface="Arial" panose="020B0604020202020204" pitchFamily="34" charset="0"/>
               </a:rPr>
-              <a:t>Falta de organização ao cadastrar </a:t>
-            </a:r>
+              <a:t>Falta de organização ao cadastrar produtos/estoque</a:t>
+            </a:r>
+          </a:p>
+          <a:p>
+            <a:pPr marL="457200" indent="-457200">
+              <a:buFont typeface="Arial" panose="020B0604020202020204" pitchFamily="34" charset="0"/>
+              <a:buChar char="•"/>
+            </a:pPr>
             <a:r>
               <a:rPr lang="pt-BR" sz="2800" dirty="0" smtClean="0">
                 <a:latin typeface="Arial" panose="020B0604020202020204" pitchFamily="34" charset="0"/>
                 <a:cs typeface="Arial" panose="020B0604020202020204" pitchFamily="34" charset="0"/>
               </a:rPr>
-              <a:t>produtos/estoque</a:t>
-            </a:r>
-          </a:p>
-          <a:p>
-            <a:pPr marL="457200" indent="-457200">
-              <a:buFont typeface="Arial" panose="020B0604020202020204" pitchFamily="34" charset="0"/>
-              <a:buChar char="•"/>
-            </a:pPr>
-            <a:r>
-              <a:rPr lang="pt-BR" sz="2800" dirty="0" smtClean="0">
-                <a:latin typeface="Arial" panose="020B0604020202020204" pitchFamily="34" charset="0"/>
-                <a:cs typeface="Arial" panose="020B0604020202020204" pitchFamily="34" charset="0"/>
-              </a:rPr>
-              <a:t>Perda </a:t>
-            </a:r>
-            <a:r>
-              <a:rPr lang="pt-BR" sz="2800" dirty="0" smtClean="0">
-                <a:latin typeface="Arial" panose="020B0604020202020204" pitchFamily="34" charset="0"/>
-                <a:cs typeface="Arial" panose="020B0604020202020204" pitchFamily="34" charset="0"/>
-              </a:rPr>
-              <a:t>de informações</a:t>
+              <a:t>Perda de informações</a:t>
             </a:r>
           </a:p>
           <a:p>
@@ -7053,83 +7279,74 @@
           <a:chExt cx="0" cy="0"/>
         </a:xfrm>
       </p:grpSpPr>
+      <p:sp>
+        <p:nvSpPr>
+          <p:cNvPr id="2" name="Título 1"/>
+          <p:cNvSpPr>
+            <a:spLocks noGrp="1"/>
+          </p:cNvSpPr>
+          <p:nvPr>
+            <p:ph type="title"/>
+          </p:nvPr>
+        </p:nvSpPr>
+        <p:spPr>
+          <a:xfrm>
+            <a:off x="254225" y="203337"/>
+            <a:ext cx="5267801" cy="485433"/>
+          </a:xfrm>
+        </p:spPr>
+        <p:txBody>
+          <a:bodyPr/>
+          <a:lstStyle/>
+          <a:p>
+            <a:r>
+              <a:rPr lang="pt-BR" sz="2800" b="1" dirty="0" smtClean="0"/>
+              <a:t>BPMN – Controle do estoque</a:t>
+            </a:r>
+            <a:endParaRPr lang="pt-BR" sz="2800" b="1" dirty="0"/>
+          </a:p>
+        </p:txBody>
+      </p:sp>
       <p:pic>
         <p:nvPicPr>
-          <p:cNvPr id="5" name="Imagem 4"/>
+          <p:cNvPr id="4" name="Imagem 3"/>
           <p:cNvPicPr>
             <a:picLocks noChangeAspect="1"/>
           </p:cNvPicPr>
           <p:nvPr/>
         </p:nvPicPr>
         <p:blipFill>
-          <a:blip r:embed="rId2"/>
+          <a:blip r:embed="rId2">
+            <a:extLst>
+              <a:ext uri="{28A0092B-C50C-407E-A947-70E740481C1C}">
+                <a14:useLocalDpi xmlns:a14="http://schemas.microsoft.com/office/drawing/2010/main" val="0"/>
+              </a:ext>
+            </a:extLst>
+          </a:blip>
           <a:stretch>
             <a:fillRect/>
           </a:stretch>
         </p:blipFill>
         <p:spPr>
           <a:xfrm>
-            <a:off x="906531" y="2186609"/>
-            <a:ext cx="10496961" cy="3263761"/>
+            <a:off x="0" y="831273"/>
+            <a:ext cx="12192000" cy="5798448"/>
           </a:xfrm>
           <a:prstGeom prst="rect">
             <a:avLst/>
           </a:prstGeom>
         </p:spPr>
       </p:pic>
-      <p:sp>
-        <p:nvSpPr>
-          <p:cNvPr id="6" name="CaixaDeTexto 5"/>
-          <p:cNvSpPr txBox="1"/>
-          <p:nvPr/>
-        </p:nvSpPr>
-        <p:spPr>
-          <a:xfrm>
-            <a:off x="4591858" y="640558"/>
-            <a:ext cx="2632212" cy="830997"/>
-          </a:xfrm>
-          <a:prstGeom prst="rect">
-            <a:avLst/>
-          </a:prstGeom>
-          <a:noFill/>
-        </p:spPr>
-        <p:txBody>
-          <a:bodyPr wrap="square" rtlCol="0">
-            <a:spAutoFit/>
-          </a:bodyPr>
-          <a:lstStyle/>
-          <a:p>
-            <a:r>
-              <a:rPr lang="pt-BR" sz="4800" dirty="0" err="1" smtClean="0">
-                <a:latin typeface="Arial" panose="020B0604020202020204" pitchFamily="34" charset="0"/>
-                <a:cs typeface="Arial" panose="020B0604020202020204" pitchFamily="34" charset="0"/>
-              </a:rPr>
-              <a:t>Backlog</a:t>
-            </a:r>
-            <a:endParaRPr lang="pt-BR" sz="5400" dirty="0">
-              <a:latin typeface="Arial" panose="020B0604020202020204" pitchFamily="34" charset="0"/>
-              <a:cs typeface="Arial" panose="020B0604020202020204" pitchFamily="34" charset="0"/>
-            </a:endParaRPr>
-          </a:p>
-        </p:txBody>
-      </p:sp>
     </p:spTree>
     <p:extLst>
       <p:ext uri="{BB962C8B-B14F-4D97-AF65-F5344CB8AC3E}">
-        <p14:creationId xmlns:p14="http://schemas.microsoft.com/office/powerpoint/2010/main" val="1410908608"/>
+        <p14:creationId xmlns:p14="http://schemas.microsoft.com/office/powerpoint/2010/main" val="3416594282"/>
       </p:ext>
     </p:extLst>
   </p:cSld>
   <p:clrMapOvr>
     <a:masterClrMapping/>
   </p:clrMapOvr>
-  <p:timing>
-    <p:tnLst>
-      <p:par>
-        <p:cTn id="1" dur="indefinite" restart="never" nodeType="tmRoot"/>
-      </p:par>
-    </p:tnLst>
-  </p:timing>
 </p:sld>
 </file>
 
@@ -7152,51 +7369,72 @@
       </p:grpSpPr>
       <p:sp>
         <p:nvSpPr>
-          <p:cNvPr id="4" name="CaixaDeTexto 3"/>
-          <p:cNvSpPr txBox="1"/>
+          <p:cNvPr id="4" name="Título 1"/>
+          <p:cNvSpPr>
+            <a:spLocks noGrp="1"/>
+          </p:cNvSpPr>
+          <p:nvPr>
+            <p:ph type="title"/>
+          </p:nvPr>
+        </p:nvSpPr>
+        <p:spPr>
+          <a:xfrm>
+            <a:off x="254226" y="96459"/>
+            <a:ext cx="3213370" cy="485433"/>
+          </a:xfrm>
+        </p:spPr>
+        <p:txBody>
+          <a:bodyPr/>
+          <a:lstStyle/>
+          <a:p>
+            <a:r>
+              <a:rPr lang="pt-BR" sz="2800" b="1" dirty="0" smtClean="0"/>
+              <a:t>BPMN – Cadastro</a:t>
+            </a:r>
+            <a:endParaRPr lang="pt-BR" sz="2800" b="1" dirty="0"/>
+          </a:p>
+        </p:txBody>
+      </p:sp>
+      <p:pic>
+        <p:nvPicPr>
+          <p:cNvPr id="5" name="Imagem 4"/>
+          <p:cNvPicPr>
+            <a:picLocks noChangeAspect="1"/>
+          </p:cNvPicPr>
           <p:nvPr/>
-        </p:nvSpPr>
-        <p:spPr>
-          <a:xfrm>
-            <a:off x="1948068" y="2590886"/>
-            <a:ext cx="8537843" cy="1107996"/>
+        </p:nvPicPr>
+        <p:blipFill>
+          <a:blip r:embed="rId2">
+            <a:extLst>
+              <a:ext uri="{28A0092B-C50C-407E-A947-70E740481C1C}">
+                <a14:useLocalDpi xmlns:a14="http://schemas.microsoft.com/office/drawing/2010/main" val="0"/>
+              </a:ext>
+            </a:extLst>
+          </a:blip>
+          <a:stretch>
+            <a:fillRect/>
+          </a:stretch>
+        </p:blipFill>
+        <p:spPr>
+          <a:xfrm>
+            <a:off x="390278" y="726870"/>
+            <a:ext cx="11601450" cy="6131130"/>
           </a:xfrm>
           <a:prstGeom prst="rect">
             <a:avLst/>
           </a:prstGeom>
-          <a:noFill/>
-        </p:spPr>
-        <p:txBody>
-          <a:bodyPr wrap="square" rtlCol="0">
-            <a:spAutoFit/>
-          </a:bodyPr>
-          <a:lstStyle/>
-          <a:p>
-            <a:r>
-              <a:rPr lang="pt-BR" sz="6600" b="1" dirty="0" smtClean="0"/>
-              <a:t>Solução de negócio</a:t>
-            </a:r>
-            <a:endParaRPr lang="pt-BR" sz="6600" b="1" dirty="0"/>
-          </a:p>
-        </p:txBody>
-      </p:sp>
+        </p:spPr>
+      </p:pic>
     </p:spTree>
     <p:extLst>
       <p:ext uri="{BB962C8B-B14F-4D97-AF65-F5344CB8AC3E}">
-        <p14:creationId xmlns:p14="http://schemas.microsoft.com/office/powerpoint/2010/main" val="2633481473"/>
+        <p14:creationId xmlns:p14="http://schemas.microsoft.com/office/powerpoint/2010/main" val="2024006408"/>
       </p:ext>
     </p:extLst>
   </p:cSld>
   <p:clrMapOvr>
     <a:masterClrMapping/>
   </p:clrMapOvr>
-  <p:timing>
-    <p:tnLst>
-      <p:par>
-        <p:cTn id="1" dur="indefinite" restart="never" nodeType="tmRoot"/>
-      </p:par>
-    </p:tnLst>
-  </p:timing>
 </p:sld>
 </file>
 
@@ -7217,24 +7455,62 @@
           <a:chExt cx="0" cy="0"/>
         </a:xfrm>
       </p:grpSpPr>
+      <p:sp>
+        <p:nvSpPr>
+          <p:cNvPr id="4" name="Título 1"/>
+          <p:cNvSpPr>
+            <a:spLocks noGrp="1"/>
+          </p:cNvSpPr>
+          <p:nvPr>
+            <p:ph type="title"/>
+          </p:nvPr>
+        </p:nvSpPr>
+        <p:spPr>
+          <a:xfrm>
+            <a:off x="456107" y="191461"/>
+            <a:ext cx="2548352" cy="485433"/>
+          </a:xfrm>
+        </p:spPr>
+        <p:txBody>
+          <a:bodyPr/>
+          <a:lstStyle/>
+          <a:p>
+            <a:r>
+              <a:rPr lang="pt-BR" sz="2800" b="1" dirty="0" smtClean="0"/>
+              <a:t>BPMN – </a:t>
+            </a:r>
+            <a:r>
+              <a:rPr lang="pt-BR" sz="2800" b="1" dirty="0" err="1" smtClean="0"/>
+              <a:t>Login</a:t>
+            </a:r>
+            <a:endParaRPr lang="pt-BR" sz="2800" b="1" dirty="0"/>
+          </a:p>
+        </p:txBody>
+      </p:sp>
       <p:pic>
         <p:nvPicPr>
-          <p:cNvPr id="4" name="Imagem 3"/>
+          <p:cNvPr id="5" name="Imagem 4"/>
           <p:cNvPicPr>
             <a:picLocks noChangeAspect="1"/>
           </p:cNvPicPr>
           <p:nvPr/>
         </p:nvPicPr>
         <p:blipFill>
-          <a:blip r:embed="rId2"/>
+          <a:blip r:embed="rId2">
+            <a:extLst>
+              <a:ext uri="{28A0092B-C50C-407E-A947-70E740481C1C}">
+                <a14:useLocalDpi xmlns:a14="http://schemas.microsoft.com/office/drawing/2010/main" val="0"/>
+              </a:ext>
+            </a:extLst>
+          </a:blip>
           <a:stretch>
             <a:fillRect/>
           </a:stretch>
         </p:blipFill>
         <p:spPr>
           <a:xfrm>
-            <a:off x="0" y="0"/>
-            <a:ext cx="12191999" cy="6858981"/>
+            <a:off x="1126424" y="834983"/>
+            <a:ext cx="9867900" cy="5829300"/>
           </a:xfrm>
           <a:prstGeom prst="rect">
             <a:avLst/>
@@ -7244,20 +7520,13 @@
     </p:spTree>
     <p:extLst>
       <p:ext uri="{BB962C8B-B14F-4D97-AF65-F5344CB8AC3E}">
-        <p14:creationId xmlns:p14="http://schemas.microsoft.com/office/powerpoint/2010/main" val="3254657391"/>
+        <p14:creationId xmlns:p14="http://schemas.microsoft.com/office/powerpoint/2010/main" val="3446901303"/>
       </p:ext>
     </p:extLst>
   </p:cSld>
   <p:clrMapOvr>
     <a:masterClrMapping/>
   </p:clrMapOvr>
-  <p:timing>
-    <p:tnLst>
-      <p:par>
-        <p:cTn id="1" dur="indefinite" restart="never" nodeType="tmRoot"/>
-      </p:par>
-    </p:tnLst>
-  </p:timing>
 </p:sld>
 </file>
 

</xml_diff>

<commit_message>
Atualização na tela de cadastro de produtos
</commit_message>
<xml_diff>
--- a/_Projeto-Estagio_/Projeto/documentacao/Documentos/Projeto.pptx
+++ b/_Projeto-Estagio_/Projeto/documentacao/Documentos/Projeto.pptx
@@ -6549,7 +6549,7 @@
       </p:sp>
       <p:pic>
         <p:nvPicPr>
-          <p:cNvPr id="2" name="Imagem 1"/>
+          <p:cNvPr id="3" name="Imagem 2"/>
           <p:cNvPicPr>
             <a:picLocks noChangeAspect="1"/>
           </p:cNvPicPr>
@@ -6569,8 +6569,38 @@
         </p:blipFill>
         <p:spPr>
           <a:xfrm>
-            <a:off x="3624262" y="33337"/>
-            <a:ext cx="4943475" cy="6791325"/>
+            <a:off x="6694942" y="952310"/>
+            <a:ext cx="4016600" cy="5587640"/>
+          </a:xfrm>
+          <a:prstGeom prst="rect">
+            <a:avLst/>
+          </a:prstGeom>
+        </p:spPr>
+      </p:pic>
+      <p:pic>
+        <p:nvPicPr>
+          <p:cNvPr id="2" name="Imagem 1"/>
+          <p:cNvPicPr>
+            <a:picLocks noChangeAspect="1"/>
+          </p:cNvPicPr>
+          <p:nvPr/>
+        </p:nvPicPr>
+        <p:blipFill>
+          <a:blip r:embed="rId3">
+            <a:extLst>
+              <a:ext uri="{28A0092B-C50C-407E-A947-70E740481C1C}">
+                <a14:useLocalDpi xmlns:a14="http://schemas.microsoft.com/office/drawing/2010/main" val="0"/>
+              </a:ext>
+            </a:extLst>
+          </a:blip>
+          <a:stretch>
+            <a:fillRect/>
+          </a:stretch>
+        </p:blipFill>
+        <p:spPr>
+          <a:xfrm>
+            <a:off x="1656481" y="952310"/>
+            <a:ext cx="4661161" cy="5587640"/>
           </a:xfrm>
           <a:prstGeom prst="rect">
             <a:avLst/>

</xml_diff>